<commit_message>
Cited sources for images
Expanded Common command notes to include remote
</commit_message>
<xml_diff>
--- a/Introduction to Git.pptx
+++ b/Introduction to Git.pptx
@@ -209,7 +209,7 @@
           <a:p>
             <a:fld id="{435D7F7F-033C-4AB3-8A75-B42E5B0ADD26}" type="datetimeFigureOut">
               <a:rPr lang="en-US" smtClean="0"/>
-              <a:t>2/11/2023</a:t>
+              <a:t>2/13/2023</a:t>
             </a:fld>
             <a:endParaRPr lang="en-US"/>
           </a:p>
@@ -867,6 +867,26 @@
           <a:p>
             <a:r>
               <a:rPr lang="en-US" dirty="0"/>
+              <a:t>Source: https://en.wikipedia.org/wiki/File:Unix_history-simple.svg </a:t>
+            </a:r>
+            <a:r>
+              <a:rPr lang="en-US"/>
+              <a:t>for entry</a:t>
+            </a:r>
+            <a:endParaRPr lang="en-US" dirty="0"/>
+          </a:p>
+          <a:p>
+            <a:r>
+              <a:rPr lang="en-US" dirty="0"/>
+              <a:t>https://en.wikipedia.org/wiki/Unix-like</a:t>
+            </a:r>
+          </a:p>
+          <a:p>
+            <a:endParaRPr lang="en-US" dirty="0"/>
+          </a:p>
+          <a:p>
+            <a:r>
+              <a:rPr lang="en-US" dirty="0"/>
               <a:t>This is an image of UNIX and UNIX-variants over time</a:t>
             </a:r>
           </a:p>
@@ -1449,7 +1469,10 @@
               <a:buFont typeface="Arial" panose="020B0604020202020204" pitchFamily="34" charset="0"/>
               <a:buChar char="•"/>
             </a:pPr>
-            <a:endParaRPr lang="en-US" b="0" i="0" dirty="0"/>
+            <a:r>
+              <a:rPr lang="en-US" b="0" i="0" dirty="0"/>
+              <a:t>remote – Modify settings for remote repositories</a:t>
+            </a:r>
           </a:p>
           <a:p>
             <a:pPr marL="171450" indent="-171450">
@@ -1780,7 +1803,7 @@
           <a:p>
             <a:fld id="{63C57C0A-3BBB-4F80-BBE3-B700307BBBBC}" type="datetimeFigureOut">
               <a:rPr lang="en-US" smtClean="0"/>
-              <a:t>2/11/2023</a:t>
+              <a:t>2/13/2023</a:t>
             </a:fld>
             <a:endParaRPr lang="en-US"/>
           </a:p>
@@ -2118,7 +2141,7 @@
           <a:p>
             <a:fld id="{63C57C0A-3BBB-4F80-BBE3-B700307BBBBC}" type="datetimeFigureOut">
               <a:rPr lang="en-US" smtClean="0"/>
-              <a:t>2/11/2023</a:t>
+              <a:t>2/13/2023</a:t>
             </a:fld>
             <a:endParaRPr lang="en-US"/>
           </a:p>
@@ -2519,7 +2542,7 @@
           <a:p>
             <a:fld id="{63C57C0A-3BBB-4F80-BBE3-B700307BBBBC}" type="datetimeFigureOut">
               <a:rPr lang="en-US" smtClean="0"/>
-              <a:t>2/11/2023</a:t>
+              <a:t>2/13/2023</a:t>
             </a:fld>
             <a:endParaRPr lang="en-US"/>
           </a:p>
@@ -2855,7 +2878,7 @@
           <a:p>
             <a:fld id="{63C57C0A-3BBB-4F80-BBE3-B700307BBBBC}" type="datetimeFigureOut">
               <a:rPr lang="en-US" smtClean="0"/>
-              <a:t>2/11/2023</a:t>
+              <a:t>2/13/2023</a:t>
             </a:fld>
             <a:endParaRPr lang="en-US"/>
           </a:p>
@@ -3175,7 +3198,7 @@
           <a:p>
             <a:fld id="{63C57C0A-3BBB-4F80-BBE3-B700307BBBBC}" type="datetimeFigureOut">
               <a:rPr lang="en-US" smtClean="0"/>
-              <a:t>2/11/2023</a:t>
+              <a:t>2/13/2023</a:t>
             </a:fld>
             <a:endParaRPr lang="en-US"/>
           </a:p>
@@ -3571,7 +3594,7 @@
           <a:p>
             <a:fld id="{63C57C0A-3BBB-4F80-BBE3-B700307BBBBC}" type="datetimeFigureOut">
               <a:rPr lang="en-US" smtClean="0"/>
-              <a:t>2/11/2023</a:t>
+              <a:t>2/13/2023</a:t>
             </a:fld>
             <a:endParaRPr lang="en-US"/>
           </a:p>
@@ -3828,7 +3851,7 @@
           <a:p>
             <a:fld id="{63C57C0A-3BBB-4F80-BBE3-B700307BBBBC}" type="datetimeFigureOut">
               <a:rPr lang="en-US" smtClean="0"/>
-              <a:t>2/11/2023</a:t>
+              <a:t>2/13/2023</a:t>
             </a:fld>
             <a:endParaRPr lang="en-US"/>
           </a:p>
@@ -4090,7 +4113,7 @@
           <a:p>
             <a:fld id="{63C57C0A-3BBB-4F80-BBE3-B700307BBBBC}" type="datetimeFigureOut">
               <a:rPr lang="en-US" smtClean="0"/>
-              <a:t>2/11/2023</a:t>
+              <a:t>2/13/2023</a:t>
             </a:fld>
             <a:endParaRPr lang="en-US"/>
           </a:p>
@@ -4352,7 +4375,7 @@
           <a:p>
             <a:fld id="{63C57C0A-3BBB-4F80-BBE3-B700307BBBBC}" type="datetimeFigureOut">
               <a:rPr lang="en-US" smtClean="0"/>
-              <a:t>2/11/2023</a:t>
+              <a:t>2/13/2023</a:t>
             </a:fld>
             <a:endParaRPr lang="en-US"/>
           </a:p>
@@ -4681,7 +4704,7 @@
           <a:p>
             <a:fld id="{63C57C0A-3BBB-4F80-BBE3-B700307BBBBC}" type="datetimeFigureOut">
               <a:rPr lang="en-US" smtClean="0"/>
-              <a:t>2/11/2023</a:t>
+              <a:t>2/13/2023</a:t>
             </a:fld>
             <a:endParaRPr lang="en-US"/>
           </a:p>
@@ -5004,7 +5027,7 @@
           <a:p>
             <a:fld id="{63C57C0A-3BBB-4F80-BBE3-B700307BBBBC}" type="datetimeFigureOut">
               <a:rPr lang="en-US" smtClean="0"/>
-              <a:t>2/11/2023</a:t>
+              <a:t>2/13/2023</a:t>
             </a:fld>
             <a:endParaRPr lang="en-US"/>
           </a:p>
@@ -5461,7 +5484,7 @@
           <a:p>
             <a:fld id="{63C57C0A-3BBB-4F80-BBE3-B700307BBBBC}" type="datetimeFigureOut">
               <a:rPr lang="en-US" smtClean="0"/>
-              <a:t>2/11/2023</a:t>
+              <a:t>2/13/2023</a:t>
             </a:fld>
             <a:endParaRPr lang="en-US"/>
           </a:p>
@@ -5666,7 +5689,7 @@
           <a:p>
             <a:fld id="{63C57C0A-3BBB-4F80-BBE3-B700307BBBBC}" type="datetimeFigureOut">
               <a:rPr lang="en-US" smtClean="0"/>
-              <a:t>2/11/2023</a:t>
+              <a:t>2/13/2023</a:t>
             </a:fld>
             <a:endParaRPr lang="en-US"/>
           </a:p>
@@ -5843,7 +5866,7 @@
           <a:p>
             <a:fld id="{63C57C0A-3BBB-4F80-BBE3-B700307BBBBC}" type="datetimeFigureOut">
               <a:rPr lang="en-US" smtClean="0"/>
-              <a:t>2/11/2023</a:t>
+              <a:t>2/13/2023</a:t>
             </a:fld>
             <a:endParaRPr lang="en-US"/>
           </a:p>
@@ -6176,7 +6199,7 @@
           <a:p>
             <a:fld id="{63C57C0A-3BBB-4F80-BBE3-B700307BBBBC}" type="datetimeFigureOut">
               <a:rPr lang="en-US" smtClean="0"/>
-              <a:t>2/11/2023</a:t>
+              <a:t>2/13/2023</a:t>
             </a:fld>
             <a:endParaRPr lang="en-US"/>
           </a:p>
@@ -6521,7 +6544,7 @@
           <a:p>
             <a:fld id="{63C57C0A-3BBB-4F80-BBE3-B700307BBBBC}" type="datetimeFigureOut">
               <a:rPr lang="en-US" smtClean="0"/>
-              <a:t>2/11/2023</a:t>
+              <a:t>2/13/2023</a:t>
             </a:fld>
             <a:endParaRPr lang="en-US"/>
           </a:p>
@@ -8638,7 +8661,7 @@
           <a:p>
             <a:fld id="{63C57C0A-3BBB-4F80-BBE3-B700307BBBBC}" type="datetimeFigureOut">
               <a:rPr lang="en-US" smtClean="0"/>
-              <a:t>2/11/2023</a:t>
+              <a:t>2/13/2023</a:t>
             </a:fld>
             <a:endParaRPr lang="en-US"/>
           </a:p>
@@ -9598,7 +9621,7 @@
           <a:p>
             <a:r>
               <a:rPr lang="en-US" dirty="0"/>
-              <a:t>Computer Science Student at Metro State University</a:t>
+              <a:t>Computer Science student at Metro State University</a:t>
             </a:r>
           </a:p>
         </p:txBody>
@@ -9897,8 +9920,8 @@
         </p:blipFill>
         <p:spPr>
           <a:xfrm>
-            <a:off x="1610639" y="600419"/>
-            <a:ext cx="8970721" cy="5657161"/>
+            <a:off x="1541920" y="557083"/>
+            <a:ext cx="9108160" cy="5743833"/>
           </a:xfrm>
           <a:prstGeom prst="rect">
             <a:avLst/>

</xml_diff>